<commit_message>
fixed time-steped termination errors
</commit_message>
<xml_diff>
--- a/docs/slides/accbba.pptx
+++ b/docs/slides/accbba.pptx
@@ -211,7 +211,7 @@
           <a:p>
             <a:fld id="{95997608-F877-A844-A447-8F4AE0FF71C9}" type="datetimeFigureOut">
               <a:rPr lang="en-US" smtClean="0"/>
-              <a:t>5/8/23</a:t>
+              <a:t>5/9/23</a:t>
             </a:fld>
             <a:endParaRPr lang="en-US"/>
           </a:p>
@@ -3552,8 +3552,8 @@
           </a:xfrm>
         </p:spPr>
       </p:pic>
-      <mc:AlternateContent xmlns:mc="http://schemas.openxmlformats.org/markup-compatibility/2006">
-        <mc:Choice xmlns:a14="http://schemas.microsoft.com/office/drawing/2010/main" Requires="a14">
+      <mc:AlternateContent xmlns:mc="http://schemas.openxmlformats.org/markup-compatibility/2006" xmlns:a14="http://schemas.microsoft.com/office/drawing/2010/main">
+        <mc:Choice Requires="a14">
           <p:sp>
             <p:nvSpPr>
               <p:cNvPr id="14" name="Content Placeholder 2">
@@ -4280,7 +4280,7 @@
             </p:txBody>
           </p:sp>
         </mc:Choice>
-        <mc:Fallback>
+        <mc:Fallback xmlns="">
           <p:sp>
             <p:nvSpPr>
               <p:cNvPr id="14" name="Content Placeholder 2">
@@ -4339,7 +4339,7 @@
         </p:nvSpPr>
         <p:spPr>
           <a:xfrm>
-            <a:off x="6332055" y="5901333"/>
+            <a:off x="6533936" y="5778222"/>
             <a:ext cx="5123346" cy="246221"/>
           </a:xfrm>
           <a:prstGeom prst="rect">
@@ -4419,8 +4419,8 @@
           </a:p>
         </p:txBody>
       </p:sp>
-      <mc:AlternateContent xmlns:mc="http://schemas.openxmlformats.org/markup-compatibility/2006">
-        <mc:Choice xmlns:a14="http://schemas.microsoft.com/office/drawing/2010/main" Requires="a14">
+      <mc:AlternateContent xmlns:mc="http://schemas.openxmlformats.org/markup-compatibility/2006" xmlns:a14="http://schemas.microsoft.com/office/drawing/2010/main">
+        <mc:Choice Requires="a14">
           <p:sp>
             <p:nvSpPr>
               <p:cNvPr id="3" name="Content Placeholder 2">
@@ -4613,7 +4613,7 @@
             </p:txBody>
           </p:sp>
         </mc:Choice>
-        <mc:Fallback>
+        <mc:Fallback xmlns="">
           <p:sp>
             <p:nvSpPr>
               <p:cNvPr id="3" name="Content Placeholder 2">
@@ -8130,17 +8130,17 @@
           </a:ln>
           <a:extLst>
             <a:ext uri="{FAA26D3D-D897-4be2-8F04-BA451C77F1D7}">
-              <ma14:placeholderFlag xmlns:lc="http://schemas.openxmlformats.org/drawingml/2006/lockedCanvas" xmlns="" xmlns:ma14="http://schemas.microsoft.com/office/mac/drawingml/2011/main" val="1"/>
+              <ma14:placeholderFlag xmlns:ma14="http://schemas.microsoft.com/office/mac/drawingml/2011/main" xmlns="" xmlns:lc="http://schemas.openxmlformats.org/drawingml/2006/lockedCanvas" val="1"/>
             </a:ext>
             <a:ext uri="{909E8E84-426E-40dd-AFC4-6F175D3DCCD1}">
-              <a14:hiddenFill xmlns:lc="http://schemas.openxmlformats.org/drawingml/2006/lockedCanvas" xmlns:a14="http://schemas.microsoft.com/office/drawing/2010/main" xmlns="">
+              <a14:hiddenFill xmlns="" xmlns:a14="http://schemas.microsoft.com/office/drawing/2010/main" xmlns:lc="http://schemas.openxmlformats.org/drawingml/2006/lockedCanvas">
                 <a:solidFill>
                   <a:srgbClr val="FFFFFF"/>
                 </a:solidFill>
               </a14:hiddenFill>
             </a:ext>
             <a:ext uri="{91240B29-F687-4f45-9708-019B960494DF}">
-              <a14:hiddenLine xmlns:lc="http://schemas.openxmlformats.org/drawingml/2006/lockedCanvas" xmlns:a14="http://schemas.microsoft.com/office/drawing/2010/main" xmlns="" w="9525">
+              <a14:hiddenLine xmlns="" xmlns:a14="http://schemas.microsoft.com/office/drawing/2010/main" xmlns:lc="http://schemas.openxmlformats.org/drawingml/2006/lockedCanvas" w="9525">
                 <a:solidFill>
                   <a:srgbClr val="000000"/>
                 </a:solidFill>
@@ -8450,17 +8450,17 @@
           </a:ln>
           <a:extLst>
             <a:ext uri="{FAA26D3D-D897-4be2-8F04-BA451C77F1D7}">
-              <ma14:placeholderFlag xmlns:lc="http://schemas.openxmlformats.org/drawingml/2006/lockedCanvas" xmlns="" xmlns:ma14="http://schemas.microsoft.com/office/mac/drawingml/2011/main" val="1"/>
+              <ma14:placeholderFlag xmlns:ma14="http://schemas.microsoft.com/office/mac/drawingml/2011/main" xmlns="" xmlns:lc="http://schemas.openxmlformats.org/drawingml/2006/lockedCanvas" val="1"/>
             </a:ext>
             <a:ext uri="{909E8E84-426E-40dd-AFC4-6F175D3DCCD1}">
-              <a14:hiddenFill xmlns:lc="http://schemas.openxmlformats.org/drawingml/2006/lockedCanvas" xmlns:a14="http://schemas.microsoft.com/office/drawing/2010/main" xmlns="">
+              <a14:hiddenFill xmlns="" xmlns:a14="http://schemas.microsoft.com/office/drawing/2010/main" xmlns:lc="http://schemas.openxmlformats.org/drawingml/2006/lockedCanvas">
                 <a:solidFill>
                   <a:srgbClr val="FFFFFF"/>
                 </a:solidFill>
               </a14:hiddenFill>
             </a:ext>
             <a:ext uri="{91240B29-F687-4f45-9708-019B960494DF}">
-              <a14:hiddenLine xmlns:lc="http://schemas.openxmlformats.org/drawingml/2006/lockedCanvas" xmlns:a14="http://schemas.microsoft.com/office/drawing/2010/main" xmlns="" w="9525">
+              <a14:hiddenLine xmlns="" xmlns:a14="http://schemas.microsoft.com/office/drawing/2010/main" xmlns:lc="http://schemas.openxmlformats.org/drawingml/2006/lockedCanvas" w="9525">
                 <a:solidFill>
                   <a:srgbClr val="000000"/>
                 </a:solidFill>
@@ -9196,7 +9196,7 @@
           <a:p>
             <a:r>
               <a:rPr lang="en-US" i="1" dirty="0"/>
-              <a:t>Environment still modeled as a server accessed by nodes</a:t>
+              <a:t>Environment modeled as a server accessed by nodes</a:t>
             </a:r>
           </a:p>
           <a:p>
@@ -9217,6 +9217,35 @@
             <a:r>
               <a:rPr lang="en-US" dirty="0"/>
               <a:t>Nodes “sense” the environment by requesting simulated data</a:t>
+            </a:r>
+          </a:p>
+          <a:p>
+            <a:endParaRPr lang="en-US" dirty="0"/>
+          </a:p>
+          <a:p>
+            <a:r>
+              <a:rPr lang="en-US" i="1" dirty="0"/>
+              <a:t>Agents modeled as network nodes</a:t>
+            </a:r>
+          </a:p>
+          <a:p>
+            <a:pPr marL="457200" indent="-457200">
+              <a:buFont typeface="Arial" panose="020B0604020202020204" pitchFamily="34" charset="0"/>
+              <a:buChar char="•"/>
+            </a:pPr>
+            <a:r>
+              <a:rPr lang="en-US" dirty="0"/>
+              <a:t>Can perform peer-to-peer messaging or broadcasts</a:t>
+            </a:r>
+          </a:p>
+          <a:p>
+            <a:pPr marL="457200" indent="-457200">
+              <a:buFont typeface="Arial" panose="020B0604020202020204" pitchFamily="34" charset="0"/>
+              <a:buChar char="•"/>
+            </a:pPr>
+            <a:r>
+              <a:rPr lang="en-US" dirty="0"/>
+              <a:t>Can request information from the environment</a:t>
             </a:r>
           </a:p>
         </p:txBody>
@@ -25899,8 +25928,8 @@
           </a:p>
         </p:txBody>
       </p:sp>
-      <mc:AlternateContent xmlns:mc="http://schemas.openxmlformats.org/markup-compatibility/2006">
-        <mc:Choice xmlns:a14="http://schemas.microsoft.com/office/drawing/2010/main" Requires="a14">
+      <mc:AlternateContent xmlns:mc="http://schemas.openxmlformats.org/markup-compatibility/2006" xmlns:a14="http://schemas.microsoft.com/office/drawing/2010/main">
+        <mc:Choice Requires="a14">
           <p:sp>
             <p:nvSpPr>
               <p:cNvPr id="4" name="Content Placeholder 2">
@@ -26627,7 +26656,7 @@
             </p:txBody>
           </p:sp>
         </mc:Choice>
-        <mc:Fallback>
+        <mc:Fallback xmlns="">
           <p:sp>
             <p:nvSpPr>
               <p:cNvPr id="4" name="Content Placeholder 2">

</xml_diff>